<commit_message>
aplicação de conceito de orientação a objetos estrutura de contratos e forms filhos, para que fique fácil replicar para o contrato final
</commit_message>
<xml_diff>
--- a/Documentação/Manual de Uso.pptx
+++ b/Documentação/Manual de Uso.pptx
@@ -845,7 +845,7 @@
             <a:fld id="{B61BEF0D-F0BB-DE4B-95CE-6DB70DBA9567}" type="datetimeFigureOut">
               <a:rPr lang="en-US" dirty="0"/>
               <a:pPr/>
-              <a:t>5/7/2018</a:t>
+              <a:t>5/14/2018</a:t>
             </a:fld>
             <a:endParaRPr lang="en-US" dirty="0"/>
           </a:p>
@@ -1093,7 +1093,7 @@
             <a:fld id="{B61BEF0D-F0BB-DE4B-95CE-6DB70DBA9567}" type="datetimeFigureOut">
               <a:rPr lang="en-US" dirty="0"/>
               <a:pPr/>
-              <a:t>5/7/2018</a:t>
+              <a:t>5/14/2018</a:t>
             </a:fld>
             <a:endParaRPr lang="en-US" dirty="0"/>
           </a:p>
@@ -1404,7 +1404,7 @@
             <a:fld id="{B61BEF0D-F0BB-DE4B-95CE-6DB70DBA9567}" type="datetimeFigureOut">
               <a:rPr lang="en-US" dirty="0"/>
               <a:pPr/>
-              <a:t>5/7/2018</a:t>
+              <a:t>5/14/2018</a:t>
             </a:fld>
             <a:endParaRPr lang="en-US" dirty="0"/>
           </a:p>
@@ -1742,7 +1742,7 @@
             <a:fld id="{B61BEF0D-F0BB-DE4B-95CE-6DB70DBA9567}" type="datetimeFigureOut">
               <a:rPr lang="en-US" dirty="0"/>
               <a:pPr/>
-              <a:t>5/7/2018</a:t>
+              <a:t>5/14/2018</a:t>
             </a:fld>
             <a:endParaRPr lang="en-US" dirty="0"/>
           </a:p>
@@ -2053,7 +2053,7 @@
             <a:fld id="{B61BEF0D-F0BB-DE4B-95CE-6DB70DBA9567}" type="datetimeFigureOut">
               <a:rPr lang="en-US" dirty="0"/>
               <a:pPr/>
-              <a:t>5/7/2018</a:t>
+              <a:t>5/14/2018</a:t>
             </a:fld>
             <a:endParaRPr lang="en-US" dirty="0"/>
           </a:p>
@@ -2443,7 +2443,7 @@
             <a:fld id="{B61BEF0D-F0BB-DE4B-95CE-6DB70DBA9567}" type="datetimeFigureOut">
               <a:rPr lang="en-US" dirty="0"/>
               <a:pPr/>
-              <a:t>5/7/2018</a:t>
+              <a:t>5/14/2018</a:t>
             </a:fld>
             <a:endParaRPr lang="en-US" dirty="0"/>
           </a:p>
@@ -2609,7 +2609,7 @@
           <a:p>
             <a:fld id="{55C6B4A9-1611-4792-9094-5F34BCA07E0B}" type="datetimeFigureOut">
               <a:rPr lang="en-US" dirty="0"/>
-              <a:t>5/7/2018</a:t>
+              <a:t>5/14/2018</a:t>
             </a:fld>
             <a:endParaRPr lang="en-US" dirty="0"/>
           </a:p>
@@ -2785,7 +2785,7 @@
             <a:fld id="{B61BEF0D-F0BB-DE4B-95CE-6DB70DBA9567}" type="datetimeFigureOut">
               <a:rPr lang="en-US" dirty="0"/>
               <a:pPr/>
-              <a:t>5/7/2018</a:t>
+              <a:t>5/14/2018</a:t>
             </a:fld>
             <a:endParaRPr lang="en-US" dirty="0"/>
           </a:p>
@@ -2958,7 +2958,7 @@
             <a:fld id="{B61BEF0D-F0BB-DE4B-95CE-6DB70DBA9567}" type="datetimeFigureOut">
               <a:rPr lang="en-US" dirty="0"/>
               <a:pPr/>
-              <a:t>5/7/2018</a:t>
+              <a:t>5/14/2018</a:t>
             </a:fld>
             <a:endParaRPr lang="en-US" dirty="0"/>
           </a:p>
@@ -3202,7 +3202,7 @@
             <a:fld id="{B61BEF0D-F0BB-DE4B-95CE-6DB70DBA9567}" type="datetimeFigureOut">
               <a:rPr lang="en-US" dirty="0"/>
               <a:pPr/>
-              <a:t>5/7/2018</a:t>
+              <a:t>5/14/2018</a:t>
             </a:fld>
             <a:endParaRPr lang="en-US" dirty="0"/>
           </a:p>
@@ -3430,7 +3430,7 @@
           <a:p>
             <a:fld id="{EB712588-04B1-427B-82EE-E8DB90309F08}" type="datetimeFigureOut">
               <a:rPr lang="en-US" dirty="0"/>
-              <a:t>5/7/2018</a:t>
+              <a:t>5/14/2018</a:t>
             </a:fld>
             <a:endParaRPr lang="en-US" dirty="0"/>
           </a:p>
@@ -3800,7 +3800,7 @@
             <a:fld id="{B61BEF0D-F0BB-DE4B-95CE-6DB70DBA9567}" type="datetimeFigureOut">
               <a:rPr lang="en-US" dirty="0"/>
               <a:pPr/>
-              <a:t>5/7/2018</a:t>
+              <a:t>5/14/2018</a:t>
             </a:fld>
             <a:endParaRPr lang="en-US" dirty="0"/>
           </a:p>
@@ -3920,7 +3920,7 @@
             <a:fld id="{B61BEF0D-F0BB-DE4B-95CE-6DB70DBA9567}" type="datetimeFigureOut">
               <a:rPr lang="en-US" dirty="0"/>
               <a:pPr/>
-              <a:t>5/7/2018</a:t>
+              <a:t>5/14/2018</a:t>
             </a:fld>
             <a:endParaRPr lang="en-US" dirty="0"/>
           </a:p>
@@ -4012,7 +4012,7 @@
             <a:fld id="{B61BEF0D-F0BB-DE4B-95CE-6DB70DBA9567}" type="datetimeFigureOut">
               <a:rPr lang="en-US" dirty="0"/>
               <a:pPr/>
-              <a:t>5/7/2018</a:t>
+              <a:t>5/14/2018</a:t>
             </a:fld>
             <a:endParaRPr lang="en-US" dirty="0"/>
           </a:p>
@@ -4263,7 +4263,7 @@
           <a:p>
             <a:fld id="{42A54C80-263E-416B-A8E0-580EDEADCBDC}" type="datetimeFigureOut">
               <a:rPr lang="en-US" dirty="0"/>
-              <a:t>5/7/2018</a:t>
+              <a:t>5/14/2018</a:t>
             </a:fld>
             <a:endParaRPr lang="en-US" dirty="0"/>
           </a:p>
@@ -4522,7 +4522,7 @@
             <a:fld id="{B61BEF0D-F0BB-DE4B-95CE-6DB70DBA9567}" type="datetimeFigureOut">
               <a:rPr lang="en-US" dirty="0"/>
               <a:pPr/>
-              <a:t>5/7/2018</a:t>
+              <a:t>5/14/2018</a:t>
             </a:fld>
             <a:endParaRPr lang="en-US" dirty="0"/>
           </a:p>
@@ -5262,7 +5262,7 @@
             <a:fld id="{B61BEF0D-F0BB-DE4B-95CE-6DB70DBA9567}" type="datetimeFigureOut">
               <a:rPr lang="en-US" dirty="0"/>
               <a:pPr/>
-              <a:t>5/7/2018</a:t>
+              <a:t>5/14/2018</a:t>
             </a:fld>
             <a:endParaRPr lang="en-US" dirty="0"/>
           </a:p>
@@ -6036,7 +6036,40 @@
                   </a:schemeClr>
                 </a:solidFill>
               </a:rPr>
-              <a:t>Quando um contrato é feito para um item do tipo bica, o botão fica habilitado, pois esse mesmo item, dependendo da peneira pode se desmembrar em outros itens, cujos quais são configurados na tela que é aberta ao clicar neste botão</a:t>
+              <a:t>Quando um contrato é feito para um item do tipo bica, </a:t>
+            </a:r>
+            <a:r>
+              <a:rPr lang="pt-BR" dirty="0" smtClean="0">
+                <a:solidFill>
+                  <a:schemeClr val="tx1">
+                    <a:lumMod val="65000"/>
+                    <a:lumOff val="35000"/>
+                  </a:schemeClr>
+                </a:solidFill>
+              </a:rPr>
+              <a:t>os campos de peneira ficam </a:t>
+            </a:r>
+            <a:r>
+              <a:rPr lang="pt-BR" dirty="0" smtClean="0">
+                <a:solidFill>
+                  <a:schemeClr val="tx1">
+                    <a:lumMod val="65000"/>
+                    <a:lumOff val="35000"/>
+                  </a:schemeClr>
+                </a:solidFill>
+              </a:rPr>
+              <a:t>habilitado, pois esse mesmo item, dependendo da peneira pode se desmembrar em outros itens, cujos quais </a:t>
+            </a:r>
+            <a:r>
+              <a:rPr lang="pt-BR" dirty="0" smtClean="0">
+                <a:solidFill>
+                  <a:schemeClr val="tx1">
+                    <a:lumMod val="65000"/>
+                    <a:lumOff val="35000"/>
+                  </a:schemeClr>
+                </a:solidFill>
+              </a:rPr>
+              <a:t>seus percentuais são configurados nos campos ao lado.</a:t>
             </a:r>
             <a:endParaRPr lang="pt-BR" dirty="0"/>
           </a:p>
@@ -6064,8 +6097,8 @@
         </p:blipFill>
         <p:spPr>
           <a:xfrm>
-            <a:off x="677333" y="562284"/>
-            <a:ext cx="8389393" cy="3025862"/>
+            <a:off x="677333" y="660137"/>
+            <a:ext cx="8389393" cy="2830156"/>
           </a:xfrm>
           <a:prstGeom prst="rect">
             <a:avLst/>
@@ -6183,42 +6216,8 @@
                   </a:schemeClr>
                 </a:solidFill>
               </a:rPr>
-              <a:t>Cadastro de Pré-Contratos</a:t>
-            </a:r>
-          </a:p>
-          <a:p>
-            <a:r>
-              <a:rPr lang="pt-BR" i="1" dirty="0" smtClean="0">
-                <a:solidFill>
-                  <a:schemeClr val="tx1">
-                    <a:lumMod val="85000"/>
-                    <a:lumOff val="15000"/>
-                  </a:schemeClr>
-                </a:solidFill>
-              </a:rPr>
-              <a:t>[@UPD_CCC1]</a:t>
-            </a:r>
-            <a:r>
-              <a:rPr lang="pt-BR" dirty="0" smtClean="0">
-                <a:solidFill>
-                  <a:schemeClr val="tx1">
-                    <a:lumMod val="85000"/>
-                    <a:lumOff val="15000"/>
-                  </a:schemeClr>
-                </a:solidFill>
-              </a:rPr>
-              <a:t> – </a:t>
-            </a:r>
-            <a:br>
-              <a:rPr lang="pt-BR" dirty="0" smtClean="0">
-                <a:solidFill>
-                  <a:schemeClr val="tx1">
-                    <a:lumMod val="85000"/>
-                    <a:lumOff val="15000"/>
-                  </a:schemeClr>
-                </a:solidFill>
-              </a:rPr>
-            </a:br>
+              <a:t>Cadastro de </a:t>
+            </a:r>
             <a:r>
               <a:rPr lang="pt-BR" dirty="0" smtClean="0">
                 <a:solidFill>
@@ -6228,19 +6227,10 @@
                   </a:schemeClr>
                 </a:solidFill>
               </a:rPr>
-              <a:t>-</a:t>
-            </a:r>
-            <a:r>
-              <a:rPr lang="pt-BR" dirty="0" smtClean="0">
-                <a:solidFill>
-                  <a:schemeClr val="tx1">
-                    <a:lumMod val="85000"/>
-                    <a:lumOff val="15000"/>
-                  </a:schemeClr>
-                </a:solidFill>
-              </a:rPr>
-              <a:t> </a:t>
-            </a:r>
+              <a:t>Pré-Contratos</a:t>
+            </a:r>
+          </a:p>
+          <a:p>
             <a:r>
               <a:rPr lang="pt-BR" dirty="0" smtClean="0">
                 <a:solidFill>
@@ -6250,88 +6240,10 @@
                   </a:schemeClr>
                 </a:solidFill>
               </a:rPr>
-              <a:t>Itens de Abertura do Pré-Contrato</a:t>
-            </a:r>
-            <a:br>
-              <a:rPr lang="pt-BR" dirty="0" smtClean="0">
-                <a:solidFill>
-                  <a:schemeClr val="tx1">
-                    <a:lumMod val="65000"/>
-                    <a:lumOff val="35000"/>
-                  </a:schemeClr>
-                </a:solidFill>
-              </a:rPr>
-            </a:br>
-            <a:r>
-              <a:rPr lang="pt-BR" dirty="0" smtClean="0">
-                <a:solidFill>
-                  <a:schemeClr val="tx1">
-                    <a:lumMod val="65000"/>
-                    <a:lumOff val="35000"/>
-                  </a:schemeClr>
-                </a:solidFill>
-              </a:rPr>
-              <a:t>- Relacionamento: </a:t>
+              <a:t> </a:t>
             </a:r>
             <a:r>
               <a:rPr lang="pt-BR" i="1" dirty="0" smtClean="0">
-                <a:solidFill>
-                  <a:schemeClr val="tx1">
-                    <a:lumMod val="65000"/>
-                    <a:lumOff val="35000"/>
-                  </a:schemeClr>
-                </a:solidFill>
-              </a:rPr>
-              <a:t>[@UPD_OCCC][</a:t>
-            </a:r>
-            <a:r>
-              <a:rPr lang="pt-BR" i="1" dirty="0" err="1" smtClean="0">
-                <a:solidFill>
-                  <a:schemeClr val="tx1">
-                    <a:lumMod val="65000"/>
-                    <a:lumOff val="35000"/>
-                  </a:schemeClr>
-                </a:solidFill>
-              </a:rPr>
-              <a:t>Code</a:t>
-            </a:r>
-            <a:r>
-              <a:rPr lang="pt-BR" i="1" dirty="0" smtClean="0">
-                <a:solidFill>
-                  <a:schemeClr val="tx1">
-                    <a:lumMod val="65000"/>
-                    <a:lumOff val="35000"/>
-                  </a:schemeClr>
-                </a:solidFill>
-              </a:rPr>
-              <a:t>] = [@UPD_CCC1][</a:t>
-            </a:r>
-            <a:r>
-              <a:rPr lang="pt-BR" i="1" dirty="0" err="1" smtClean="0">
-                <a:solidFill>
-                  <a:schemeClr val="tx1">
-                    <a:lumMod val="65000"/>
-                    <a:lumOff val="35000"/>
-                  </a:schemeClr>
-                </a:solidFill>
-              </a:rPr>
-              <a:t>Code</a:t>
-            </a:r>
-            <a:r>
-              <a:rPr lang="pt-BR" i="1" dirty="0" smtClean="0">
-                <a:solidFill>
-                  <a:schemeClr val="tx1">
-                    <a:lumMod val="65000"/>
-                    <a:lumOff val="35000"/>
-                  </a:schemeClr>
-                </a:solidFill>
-              </a:rPr>
-              <a:t>];</a:t>
-            </a:r>
-          </a:p>
-          <a:p>
-            <a:r>
-              <a:rPr lang="pt-BR" i="1" dirty="0">
                 <a:solidFill>
                   <a:schemeClr val="tx1">
                     <a:lumMod val="85000"/>
@@ -7238,11 +7150,7 @@
           <a:p>
             <a:r>
               <a:rPr lang="pt-BR" dirty="0" smtClean="0"/>
-              <a:t>Conclusão: </a:t>
-            </a:r>
-            <a:r>
-              <a:rPr lang="pt-BR" dirty="0" smtClean="0"/>
-              <a:t>XX/XX/XXXX</a:t>
+              <a:t>Conclusão: XX/XX/XXXX</a:t>
             </a:r>
             <a:endParaRPr lang="pt-BR" dirty="0"/>
           </a:p>
@@ -8272,9 +8180,10 @@
               <a:t>2.1 </a:t>
             </a:r>
             <a:r>
-              <a:rPr lang="pt-BR" dirty="0"/>
-              <a:t>Tela de Pré-Contrato</a:t>
-            </a:r>
+              <a:rPr lang="pt-BR" dirty="0" smtClean="0"/>
+              <a:t>Configuração de Visualização</a:t>
+            </a:r>
+            <a:endParaRPr lang="pt-BR" dirty="0"/>
           </a:p>
         </p:txBody>
       </p:sp>

</xml_diff>